<commit_message>
Slide updates and Readme changes
</commit_message>
<xml_diff>
--- a/Slides.pptx
+++ b/Slides.pptx
@@ -5,16 +5,22 @@
     <p:sldMasterId id="2147483648" r:id="rId1"/>
   </p:sldMasterIdLst>
   <p:notesMasterIdLst>
-    <p:notesMasterId r:id="rId6"/>
+    <p:notesMasterId r:id="rId12"/>
   </p:notesMasterIdLst>
   <p:handoutMasterIdLst>
-    <p:handoutMasterId r:id="rId7"/>
+    <p:handoutMasterId r:id="rId13"/>
   </p:handoutMasterIdLst>
   <p:sldIdLst>
     <p:sldId id="256" r:id="rId2"/>
     <p:sldId id="265" r:id="rId3"/>
     <p:sldId id="276" r:id="rId4"/>
     <p:sldId id="277" r:id="rId5"/>
+    <p:sldId id="278" r:id="rId6"/>
+    <p:sldId id="279" r:id="rId7"/>
+    <p:sldId id="280" r:id="rId8"/>
+    <p:sldId id="281" r:id="rId9"/>
+    <p:sldId id="282" r:id="rId10"/>
+    <p:sldId id="283" r:id="rId11"/>
   </p:sldIdLst>
   <p:sldSz cx="12192000" cy="6858000"/>
   <p:notesSz cx="6858000" cy="9144000"/>
@@ -217,7 +223,7 @@
           <a:p>
             <a:fld id="{762B48F5-BACC-47D6-A0F7-82FBF9C6BC85}" type="datetimeFigureOut">
               <a:rPr lang="en-US"/>
-              <a:t>10/18/2019</a:t>
+              <a:t>10/31/2019</a:t>
             </a:fld>
             <a:endParaRPr/>
           </a:p>
@@ -382,7 +388,7 @@
           <a:p>
             <a:fld id="{0CB1CD00-5424-4675-AB18-2C419B060449}" type="datetimeFigureOut">
               <a:rPr lang="en-US"/>
-              <a:t>10/18/2019</a:t>
+              <a:t>10/31/2019</a:t>
             </a:fld>
             <a:endParaRPr/>
           </a:p>
@@ -1027,7 +1033,7 @@
           <a:p>
             <a:fld id="{37CC0096-1860-4642-9CD2-0079EA5E7CD1}" type="datetimeFigureOut">
               <a:rPr lang="en-US" smtClean="0"/>
-              <a:t>10/18/2019</a:t>
+              <a:t>10/31/2019</a:t>
             </a:fld>
             <a:endParaRPr lang="en-US"/>
           </a:p>
@@ -1206,7 +1212,7 @@
           <a:p>
             <a:fld id="{37CC0096-1860-4642-9CD2-0079EA5E7CD1}" type="datetimeFigureOut">
               <a:rPr lang="en-US" smtClean="0"/>
-              <a:t>10/18/2019</a:t>
+              <a:t>10/31/2019</a:t>
             </a:fld>
             <a:endParaRPr lang="en-US"/>
           </a:p>
@@ -1379,7 +1385,7 @@
           <a:p>
             <a:fld id="{37CC0096-1860-4642-9CD2-0079EA5E7CD1}" type="datetimeFigureOut">
               <a:rPr lang="en-US" smtClean="0"/>
-              <a:t>10/18/2019</a:t>
+              <a:t>10/31/2019</a:t>
             </a:fld>
             <a:endParaRPr lang="en-US"/>
           </a:p>
@@ -1812,7 +1818,7 @@
           <a:p>
             <a:fld id="{37CC0096-1860-4642-9CD2-0079EA5E7CD1}" type="datetimeFigureOut">
               <a:rPr lang="en-US" smtClean="0"/>
-              <a:t>10/18/2019</a:t>
+              <a:t>10/31/2019</a:t>
             </a:fld>
             <a:endParaRPr lang="en-US"/>
           </a:p>
@@ -2251,7 +2257,7 @@
           <a:p>
             <a:fld id="{37CC0096-1860-4642-9CD2-0079EA5E7CD1}" type="datetimeFigureOut">
               <a:rPr lang="en-US" smtClean="0"/>
-              <a:t>10/18/2019</a:t>
+              <a:t>10/31/2019</a:t>
             </a:fld>
             <a:endParaRPr lang="en-US"/>
           </a:p>
@@ -2368,7 +2374,7 @@
           <a:p>
             <a:fld id="{37CC0096-1860-4642-9CD2-0079EA5E7CD1}" type="datetimeFigureOut">
               <a:rPr lang="en-US" smtClean="0"/>
-              <a:t>10/18/2019</a:t>
+              <a:t>10/31/2019</a:t>
             </a:fld>
             <a:endParaRPr lang="en-US"/>
           </a:p>
@@ -2463,7 +2469,7 @@
           <a:p>
             <a:fld id="{37CC0096-1860-4642-9CD2-0079EA5E7CD1}" type="datetimeFigureOut">
               <a:rPr lang="en-US" smtClean="0"/>
-              <a:t>10/18/2019</a:t>
+              <a:t>10/31/2019</a:t>
             </a:fld>
             <a:endParaRPr lang="en-US"/>
           </a:p>
@@ -2747,7 +2753,7 @@
           <a:p>
             <a:fld id="{37CC0096-1860-4642-9CD2-0079EA5E7CD1}" type="datetimeFigureOut">
               <a:rPr lang="en-US" smtClean="0"/>
-              <a:t>10/18/2019</a:t>
+              <a:t>10/31/2019</a:t>
             </a:fld>
             <a:endParaRPr lang="en-US"/>
           </a:p>
@@ -3058,7 +3064,7 @@
           <a:p>
             <a:fld id="{37CC0096-1860-4642-9CD2-0079EA5E7CD1}" type="datetimeFigureOut">
               <a:rPr lang="en-US" smtClean="0"/>
-              <a:t>10/18/2019</a:t>
+              <a:t>10/31/2019</a:t>
             </a:fld>
             <a:endParaRPr lang="en-US"/>
           </a:p>
@@ -3290,7 +3296,7 @@
             <a:fld id="{37CC0096-1860-4642-9CD2-0079EA5E7CD1}" type="datetimeFigureOut">
               <a:rPr lang="en-US" smtClean="0"/>
               <a:pPr/>
-              <a:t>10/18/2019</a:t>
+              <a:t>10/31/2019</a:t>
             </a:fld>
             <a:endParaRPr lang="en-US"/>
           </a:p>
@@ -3776,6 +3782,65 @@
 </p:sld>
 </file>
 
+<file path=ppt/slides/slide10.xml><?xml version="1.0" encoding="utf-8"?>
+<p:sld xmlns:a="http://schemas.openxmlformats.org/drawingml/2006/main" xmlns:r="http://schemas.openxmlformats.org/officeDocument/2006/relationships" xmlns:p="http://schemas.openxmlformats.org/presentationml/2006/main">
+  <p:cSld>
+    <p:spTree>
+      <p:nvGrpSpPr>
+        <p:cNvPr id="1" name=""/>
+        <p:cNvGrpSpPr/>
+        <p:nvPr/>
+      </p:nvGrpSpPr>
+      <p:grpSpPr>
+        <a:xfrm>
+          <a:off x="0" y="0"/>
+          <a:ext cx="0" cy="0"/>
+          <a:chOff x="0" y="0"/>
+          <a:chExt cx="0" cy="0"/>
+        </a:xfrm>
+      </p:grpSpPr>
+      <p:sp>
+        <p:nvSpPr>
+          <p:cNvPr id="13" name="Title 12"/>
+          <p:cNvSpPr>
+            <a:spLocks noGrp="1"/>
+          </p:cNvSpPr>
+          <p:nvPr>
+            <p:ph type="title"/>
+          </p:nvPr>
+        </p:nvSpPr>
+        <p:spPr>
+          <a:xfrm>
+            <a:off x="1524000" y="2857500"/>
+            <a:ext cx="9144000" cy="1143000"/>
+          </a:xfrm>
+        </p:spPr>
+        <p:txBody>
+          <a:bodyPr/>
+          <a:lstStyle/>
+          <a:p>
+            <a:pPr algn="ctr"/>
+            <a:r>
+              <a:rPr lang="en-US" dirty="0"/>
+              <a:t>Questions</a:t>
+            </a:r>
+            <a:endParaRPr dirty="0"/>
+          </a:p>
+        </p:txBody>
+      </p:sp>
+    </p:spTree>
+    <p:extLst>
+      <p:ext uri="{BB962C8B-B14F-4D97-AF65-F5344CB8AC3E}">
+        <p14:creationId xmlns:p14="http://schemas.microsoft.com/office/powerpoint/2010/main" val="2729256099"/>
+      </p:ext>
+    </p:extLst>
+  </p:cSld>
+  <p:clrMapOvr>
+    <a:masterClrMapping/>
+  </p:clrMapOvr>
+</p:sld>
+</file>
+
 <file path=ppt/slides/slide2.xml><?xml version="1.0" encoding="utf-8"?>
 <p:sld xmlns:a="http://schemas.openxmlformats.org/drawingml/2006/main" xmlns:r="http://schemas.openxmlformats.org/officeDocument/2006/relationships" xmlns:p="http://schemas.openxmlformats.org/presentationml/2006/main">
   <p:cSld>
@@ -3880,6 +3945,281 @@
   <p:clrMapOvr>
     <a:masterClrMapping/>
   </p:clrMapOvr>
+  <p:timing>
+    <p:tnLst>
+      <p:par>
+        <p:cTn id="1" dur="indefinite" restart="never" nodeType="tmRoot">
+          <p:childTnLst>
+            <p:seq concurrent="1" nextAc="seek">
+              <p:cTn id="2" dur="indefinite" nodeType="mainSeq">
+                <p:childTnLst>
+                  <p:par>
+                    <p:cTn id="3" fill="hold">
+                      <p:stCondLst>
+                        <p:cond delay="indefinite"/>
+                      </p:stCondLst>
+                      <p:childTnLst>
+                        <p:par>
+                          <p:cTn id="4" fill="hold">
+                            <p:stCondLst>
+                              <p:cond delay="0"/>
+                            </p:stCondLst>
+                            <p:childTnLst>
+                              <p:par>
+                                <p:cTn id="5" presetID="1" presetClass="entr" presetSubtype="0" fill="hold" nodeType="clickEffect">
+                                  <p:stCondLst>
+                                    <p:cond delay="0"/>
+                                  </p:stCondLst>
+                                  <p:childTnLst>
+                                    <p:set>
+                                      <p:cBhvr>
+                                        <p:cTn id="6" dur="1" fill="hold">
+                                          <p:stCondLst>
+                                            <p:cond delay="0"/>
+                                          </p:stCondLst>
+                                        </p:cTn>
+                                        <p:tgtEl>
+                                          <p:spTgt spid="14">
+                                            <p:txEl>
+                                              <p:pRg st="0" end="0"/>
+                                            </p:txEl>
+                                          </p:spTgt>
+                                        </p:tgtEl>
+                                        <p:attrNameLst>
+                                          <p:attrName>style.visibility</p:attrName>
+                                        </p:attrNameLst>
+                                      </p:cBhvr>
+                                      <p:to>
+                                        <p:strVal val="visible"/>
+                                      </p:to>
+                                    </p:set>
+                                  </p:childTnLst>
+                                </p:cTn>
+                              </p:par>
+                            </p:childTnLst>
+                          </p:cTn>
+                        </p:par>
+                      </p:childTnLst>
+                    </p:cTn>
+                  </p:par>
+                  <p:par>
+                    <p:cTn id="7" fill="hold">
+                      <p:stCondLst>
+                        <p:cond delay="indefinite"/>
+                      </p:stCondLst>
+                      <p:childTnLst>
+                        <p:par>
+                          <p:cTn id="8" fill="hold">
+                            <p:stCondLst>
+                              <p:cond delay="0"/>
+                            </p:stCondLst>
+                            <p:childTnLst>
+                              <p:par>
+                                <p:cTn id="9" presetID="1" presetClass="entr" presetSubtype="0" fill="hold" nodeType="clickEffect">
+                                  <p:stCondLst>
+                                    <p:cond delay="0"/>
+                                  </p:stCondLst>
+                                  <p:childTnLst>
+                                    <p:set>
+                                      <p:cBhvr>
+                                        <p:cTn id="10" dur="1" fill="hold">
+                                          <p:stCondLst>
+                                            <p:cond delay="0"/>
+                                          </p:stCondLst>
+                                        </p:cTn>
+                                        <p:tgtEl>
+                                          <p:spTgt spid="14">
+                                            <p:txEl>
+                                              <p:pRg st="1" end="1"/>
+                                            </p:txEl>
+                                          </p:spTgt>
+                                        </p:tgtEl>
+                                        <p:attrNameLst>
+                                          <p:attrName>style.visibility</p:attrName>
+                                        </p:attrNameLst>
+                                      </p:cBhvr>
+                                      <p:to>
+                                        <p:strVal val="visible"/>
+                                      </p:to>
+                                    </p:set>
+                                  </p:childTnLst>
+                                </p:cTn>
+                              </p:par>
+                            </p:childTnLst>
+                          </p:cTn>
+                        </p:par>
+                      </p:childTnLst>
+                    </p:cTn>
+                  </p:par>
+                  <p:par>
+                    <p:cTn id="11" fill="hold">
+                      <p:stCondLst>
+                        <p:cond delay="indefinite"/>
+                      </p:stCondLst>
+                      <p:childTnLst>
+                        <p:par>
+                          <p:cTn id="12" fill="hold">
+                            <p:stCondLst>
+                              <p:cond delay="0"/>
+                            </p:stCondLst>
+                            <p:childTnLst>
+                              <p:par>
+                                <p:cTn id="13" presetID="1" presetClass="entr" presetSubtype="0" fill="hold" nodeType="clickEffect">
+                                  <p:stCondLst>
+                                    <p:cond delay="0"/>
+                                  </p:stCondLst>
+                                  <p:childTnLst>
+                                    <p:set>
+                                      <p:cBhvr>
+                                        <p:cTn id="14" dur="1" fill="hold">
+                                          <p:stCondLst>
+                                            <p:cond delay="0"/>
+                                          </p:stCondLst>
+                                        </p:cTn>
+                                        <p:tgtEl>
+                                          <p:spTgt spid="14">
+                                            <p:txEl>
+                                              <p:pRg st="2" end="2"/>
+                                            </p:txEl>
+                                          </p:spTgt>
+                                        </p:tgtEl>
+                                        <p:attrNameLst>
+                                          <p:attrName>style.visibility</p:attrName>
+                                        </p:attrNameLst>
+                                      </p:cBhvr>
+                                      <p:to>
+                                        <p:strVal val="visible"/>
+                                      </p:to>
+                                    </p:set>
+                                  </p:childTnLst>
+                                </p:cTn>
+                              </p:par>
+                            </p:childTnLst>
+                          </p:cTn>
+                        </p:par>
+                      </p:childTnLst>
+                    </p:cTn>
+                  </p:par>
+                  <p:par>
+                    <p:cTn id="15" fill="hold">
+                      <p:stCondLst>
+                        <p:cond delay="indefinite"/>
+                      </p:stCondLst>
+                      <p:childTnLst>
+                        <p:par>
+                          <p:cTn id="16" fill="hold">
+                            <p:stCondLst>
+                              <p:cond delay="0"/>
+                            </p:stCondLst>
+                            <p:childTnLst>
+                              <p:par>
+                                <p:cTn id="17" presetID="1" presetClass="entr" presetSubtype="0" fill="hold" nodeType="clickEffect">
+                                  <p:stCondLst>
+                                    <p:cond delay="0"/>
+                                  </p:stCondLst>
+                                  <p:childTnLst>
+                                    <p:set>
+                                      <p:cBhvr>
+                                        <p:cTn id="18" dur="1" fill="hold">
+                                          <p:stCondLst>
+                                            <p:cond delay="0"/>
+                                          </p:stCondLst>
+                                        </p:cTn>
+                                        <p:tgtEl>
+                                          <p:spTgt spid="14">
+                                            <p:txEl>
+                                              <p:pRg st="3" end="3"/>
+                                            </p:txEl>
+                                          </p:spTgt>
+                                        </p:tgtEl>
+                                        <p:attrNameLst>
+                                          <p:attrName>style.visibility</p:attrName>
+                                        </p:attrNameLst>
+                                      </p:cBhvr>
+                                      <p:to>
+                                        <p:strVal val="visible"/>
+                                      </p:to>
+                                    </p:set>
+                                  </p:childTnLst>
+                                </p:cTn>
+                              </p:par>
+                            </p:childTnLst>
+                          </p:cTn>
+                        </p:par>
+                      </p:childTnLst>
+                    </p:cTn>
+                  </p:par>
+                  <p:par>
+                    <p:cTn id="19" fill="hold">
+                      <p:stCondLst>
+                        <p:cond delay="indefinite"/>
+                      </p:stCondLst>
+                      <p:childTnLst>
+                        <p:par>
+                          <p:cTn id="20" fill="hold">
+                            <p:stCondLst>
+                              <p:cond delay="0"/>
+                            </p:stCondLst>
+                            <p:childTnLst>
+                              <p:par>
+                                <p:cTn id="21" presetID="1" presetClass="entr" presetSubtype="0" fill="hold" nodeType="clickEffect">
+                                  <p:stCondLst>
+                                    <p:cond delay="0"/>
+                                  </p:stCondLst>
+                                  <p:childTnLst>
+                                    <p:set>
+                                      <p:cBhvr>
+                                        <p:cTn id="22" dur="1" fill="hold">
+                                          <p:stCondLst>
+                                            <p:cond delay="0"/>
+                                          </p:stCondLst>
+                                        </p:cTn>
+                                        <p:tgtEl>
+                                          <p:spTgt spid="14">
+                                            <p:txEl>
+                                              <p:pRg st="4" end="4"/>
+                                            </p:txEl>
+                                          </p:spTgt>
+                                        </p:tgtEl>
+                                        <p:attrNameLst>
+                                          <p:attrName>style.visibility</p:attrName>
+                                        </p:attrNameLst>
+                                      </p:cBhvr>
+                                      <p:to>
+                                        <p:strVal val="visible"/>
+                                      </p:to>
+                                    </p:set>
+                                  </p:childTnLst>
+                                </p:cTn>
+                              </p:par>
+                            </p:childTnLst>
+                          </p:cTn>
+                        </p:par>
+                      </p:childTnLst>
+                    </p:cTn>
+                  </p:par>
+                </p:childTnLst>
+              </p:cTn>
+              <p:prevCondLst>
+                <p:cond evt="onPrev" delay="0">
+                  <p:tgtEl>
+                    <p:sldTgt/>
+                  </p:tgtEl>
+                </p:cond>
+              </p:prevCondLst>
+              <p:nextCondLst>
+                <p:cond evt="onNext" delay="0">
+                  <p:tgtEl>
+                    <p:sldTgt/>
+                  </p:tgtEl>
+                </p:cond>
+              </p:nextCondLst>
+            </p:seq>
+          </p:childTnLst>
+        </p:cTn>
+      </p:par>
+    </p:tnLst>
+  </p:timing>
 </p:sld>
 </file>
 
@@ -3917,7 +4257,7 @@
           <a:p>
             <a:r>
               <a:rPr lang="en-US" dirty="0"/>
-              <a:t>OData</a:t>
+              <a:t>OData – Open Data Protocol</a:t>
             </a:r>
             <a:endParaRPr dirty="0"/>
           </a:p>
@@ -3940,39 +4280,34 @@
           <a:p>
             <a:r>
               <a:rPr lang="en-US" dirty="0"/>
-              <a:t>Can we add a search across multiple fields?</a:t>
+              <a:t>Created by Microsoft in 2007</a:t>
             </a:r>
           </a:p>
           <a:p>
             <a:r>
               <a:rPr lang="en-US" dirty="0"/>
-              <a:t>Can I order the results by multiple columns?</a:t>
-            </a:r>
-            <a:endParaRPr dirty="0"/>
+              <a:t>Version 4 was submitted to OASIS (Organization for the Advancement of Structured Information Standards) in 2014 to become a standard.</a:t>
+            </a:r>
           </a:p>
           <a:p>
             <a:r>
               <a:rPr lang="en-US" dirty="0"/>
-              <a:t>Can I just get the “Name” field?</a:t>
-            </a:r>
-          </a:p>
-          <a:p>
-            <a:r>
-              <a:rPr lang="en-US" dirty="0"/>
-              <a:t>Can I just get 10, 25 or 100 records at a time (Can you add paging)?</a:t>
-            </a:r>
-            <a:endParaRPr dirty="0"/>
-          </a:p>
-          <a:p>
-            <a:r>
-              <a:rPr lang="en-US" dirty="0"/>
-              <a:t>Can you return related table data?</a:t>
-            </a:r>
-          </a:p>
-          <a:p>
-            <a:pPr marL="0" indent="0">
-              <a:buNone/>
-            </a:pPr>
+              <a:t>OData supports REST and JSON</a:t>
+            </a:r>
+          </a:p>
+          <a:p>
+            <a:endParaRPr lang="en-US" dirty="0"/>
+          </a:p>
+          <a:p>
+            <a:r>
+              <a:rPr lang="en-US" dirty="0">
+                <a:hlinkClick r:id="rId2"/>
+              </a:rPr>
+              <a:t>https://odata.org</a:t>
+            </a:r>
+            <a:endParaRPr lang="en-US" dirty="0"/>
+          </a:p>
+          <a:p>
             <a:endParaRPr lang="en-US" dirty="0"/>
           </a:p>
         </p:txBody>
@@ -4047,7 +4382,7 @@
           <a:p>
             <a:r>
               <a:rPr lang="en-US" dirty="0"/>
-              <a:t>$select</a:t>
+              <a:t>$select – Only return the fields specified</a:t>
             </a:r>
           </a:p>
           <a:p>
@@ -4059,30 +4394,33 @@
               <a:rPr lang="en-US" dirty="0" err="1"/>
               <a:t>orderby</a:t>
             </a:r>
-            <a:endParaRPr lang="en-US" dirty="0"/>
-          </a:p>
-          <a:p>
             <a:r>
               <a:rPr lang="en-US" dirty="0"/>
-              <a:t>$filter</a:t>
+              <a:t> – Order the results by any field</a:t>
             </a:r>
           </a:p>
           <a:p>
             <a:r>
               <a:rPr lang="en-US" dirty="0"/>
-              <a:t>$top</a:t>
+              <a:t>$filter – Filter on any field</a:t>
             </a:r>
           </a:p>
           <a:p>
             <a:r>
               <a:rPr lang="en-US" dirty="0"/>
-              <a:t>$skip</a:t>
+              <a:t>$top – Specify how many results to return</a:t>
             </a:r>
           </a:p>
           <a:p>
             <a:r>
               <a:rPr lang="en-US" dirty="0"/>
-              <a:t>$expand</a:t>
+              <a:t>$skip – Skip to the next page of results</a:t>
+            </a:r>
+          </a:p>
+          <a:p>
+            <a:r>
+              <a:rPr lang="en-US" dirty="0"/>
+              <a:t>$expand – Return related data</a:t>
             </a:r>
           </a:p>
           <a:p>
@@ -4097,6 +4435,1619 @@
     <p:extLst>
       <p:ext uri="{BB962C8B-B14F-4D97-AF65-F5344CB8AC3E}">
         <p14:creationId xmlns:p14="http://schemas.microsoft.com/office/powerpoint/2010/main" val="384529018"/>
+      </p:ext>
+    </p:extLst>
+  </p:cSld>
+  <p:clrMapOvr>
+    <a:masterClrMapping/>
+  </p:clrMapOvr>
+</p:sld>
+</file>
+
+<file path=ppt/slides/slide5.xml><?xml version="1.0" encoding="utf-8"?>
+<p:sld xmlns:a="http://schemas.openxmlformats.org/drawingml/2006/main" xmlns:r="http://schemas.openxmlformats.org/officeDocument/2006/relationships" xmlns:p="http://schemas.openxmlformats.org/presentationml/2006/main">
+  <p:cSld>
+    <p:spTree>
+      <p:nvGrpSpPr>
+        <p:cNvPr id="1" name=""/>
+        <p:cNvGrpSpPr/>
+        <p:nvPr/>
+      </p:nvGrpSpPr>
+      <p:grpSpPr>
+        <a:xfrm>
+          <a:off x="0" y="0"/>
+          <a:ext cx="0" cy="0"/>
+          <a:chOff x="0" y="0"/>
+          <a:chExt cx="0" cy="0"/>
+        </a:xfrm>
+      </p:grpSpPr>
+      <p:sp>
+        <p:nvSpPr>
+          <p:cNvPr id="13" name="Title 12"/>
+          <p:cNvSpPr>
+            <a:spLocks noGrp="1"/>
+          </p:cNvSpPr>
+          <p:nvPr>
+            <p:ph type="title"/>
+          </p:nvPr>
+        </p:nvSpPr>
+        <p:spPr/>
+        <p:txBody>
+          <a:bodyPr/>
+          <a:lstStyle/>
+          <a:p>
+            <a:r>
+              <a:rPr lang="en-US" dirty="0"/>
+              <a:t>Step 1: Install NuGet Package</a:t>
+            </a:r>
+            <a:endParaRPr dirty="0"/>
+          </a:p>
+        </p:txBody>
+      </p:sp>
+      <p:sp>
+        <p:nvSpPr>
+          <p:cNvPr id="14" name="Content Placeholder 13"/>
+          <p:cNvSpPr>
+            <a:spLocks noGrp="1"/>
+          </p:cNvSpPr>
+          <p:nvPr>
+            <p:ph idx="1"/>
+          </p:nvPr>
+        </p:nvSpPr>
+        <p:spPr/>
+        <p:txBody>
+          <a:bodyPr/>
+          <a:lstStyle/>
+          <a:p>
+            <a:pPr marL="0" indent="0">
+              <a:buNone/>
+            </a:pPr>
+            <a:r>
+              <a:rPr lang="en-US" dirty="0">
+                <a:latin typeface="Courier New" panose="02070309020205020404" pitchFamily="49" charset="0"/>
+                <a:cs typeface="Courier New" panose="02070309020205020404" pitchFamily="49" charset="0"/>
+              </a:rPr>
+              <a:t>dotnet add package </a:t>
+            </a:r>
+            <a:r>
+              <a:rPr lang="en-US" dirty="0" err="1">
+                <a:latin typeface="Courier New" panose="02070309020205020404" pitchFamily="49" charset="0"/>
+                <a:cs typeface="Courier New" panose="02070309020205020404" pitchFamily="49" charset="0"/>
+              </a:rPr>
+              <a:t>Microsoft.AspNetCore.Odata</a:t>
+            </a:r>
+            <a:endParaRPr lang="en-US" dirty="0">
+              <a:latin typeface="Courier New" panose="02070309020205020404" pitchFamily="49" charset="0"/>
+              <a:cs typeface="Courier New" panose="02070309020205020404" pitchFamily="49" charset="0"/>
+            </a:endParaRPr>
+          </a:p>
+          <a:p>
+            <a:pPr marL="0" indent="0">
+              <a:buNone/>
+            </a:pPr>
+            <a:endParaRPr lang="en-US" dirty="0"/>
+          </a:p>
+          <a:p>
+            <a:pPr marL="0" indent="0">
+              <a:buNone/>
+            </a:pPr>
+            <a:r>
+              <a:rPr lang="en-US" dirty="0"/>
+              <a:t>This is will add the package to your .</a:t>
+            </a:r>
+            <a:r>
+              <a:rPr lang="en-US" dirty="0" err="1"/>
+              <a:t>csproj</a:t>
+            </a:r>
+            <a:r>
+              <a:rPr lang="en-US" dirty="0"/>
+              <a:t> file</a:t>
+            </a:r>
+          </a:p>
+          <a:p>
+            <a:pPr marL="0" indent="0">
+              <a:buNone/>
+            </a:pPr>
+            <a:r>
+              <a:rPr lang="en-US" sz="1600" dirty="0">
+                <a:latin typeface="Courier New" panose="02070309020205020404" pitchFamily="49" charset="0"/>
+                <a:cs typeface="Courier New" panose="02070309020205020404" pitchFamily="49" charset="0"/>
+              </a:rPr>
+              <a:t>&lt;</a:t>
+            </a:r>
+            <a:r>
+              <a:rPr lang="en-US" sz="1600" dirty="0" err="1">
+                <a:solidFill>
+                  <a:srgbClr val="0070C0"/>
+                </a:solidFill>
+                <a:latin typeface="Courier New" panose="02070309020205020404" pitchFamily="49" charset="0"/>
+                <a:cs typeface="Courier New" panose="02070309020205020404" pitchFamily="49" charset="0"/>
+              </a:rPr>
+              <a:t>PackageReference</a:t>
+            </a:r>
+            <a:r>
+              <a:rPr lang="en-US" sz="1600" dirty="0">
+                <a:latin typeface="Courier New" panose="02070309020205020404" pitchFamily="49" charset="0"/>
+                <a:cs typeface="Courier New" panose="02070309020205020404" pitchFamily="49" charset="0"/>
+              </a:rPr>
+              <a:t> </a:t>
+            </a:r>
+            <a:r>
+              <a:rPr lang="en-US" sz="1600" dirty="0">
+                <a:solidFill>
+                  <a:srgbClr val="00B0F0"/>
+                </a:solidFill>
+                <a:latin typeface="Courier New" panose="02070309020205020404" pitchFamily="49" charset="0"/>
+                <a:cs typeface="Courier New" panose="02070309020205020404" pitchFamily="49" charset="0"/>
+              </a:rPr>
+              <a:t>Include</a:t>
+            </a:r>
+            <a:r>
+              <a:rPr lang="en-US" sz="1600" dirty="0">
+                <a:latin typeface="Courier New" panose="02070309020205020404" pitchFamily="49" charset="0"/>
+                <a:cs typeface="Courier New" panose="02070309020205020404" pitchFamily="49" charset="0"/>
+              </a:rPr>
+              <a:t>="</a:t>
+            </a:r>
+            <a:r>
+              <a:rPr lang="en-US" sz="1600" dirty="0" err="1">
+                <a:solidFill>
+                  <a:srgbClr val="C00000"/>
+                </a:solidFill>
+                <a:latin typeface="Courier New" panose="02070309020205020404" pitchFamily="49" charset="0"/>
+                <a:cs typeface="Courier New" panose="02070309020205020404" pitchFamily="49" charset="0"/>
+              </a:rPr>
+              <a:t>Microsoft.AspNetCore.OData</a:t>
+            </a:r>
+            <a:r>
+              <a:rPr lang="en-US" sz="1600" dirty="0">
+                <a:latin typeface="Courier New" panose="02070309020205020404" pitchFamily="49" charset="0"/>
+                <a:cs typeface="Courier New" panose="02070309020205020404" pitchFamily="49" charset="0"/>
+              </a:rPr>
+              <a:t>" </a:t>
+            </a:r>
+            <a:r>
+              <a:rPr lang="en-US" sz="1600" dirty="0">
+                <a:solidFill>
+                  <a:srgbClr val="00B0F0"/>
+                </a:solidFill>
+                <a:latin typeface="Courier New" panose="02070309020205020404" pitchFamily="49" charset="0"/>
+                <a:cs typeface="Courier New" panose="02070309020205020404" pitchFamily="49" charset="0"/>
+              </a:rPr>
+              <a:t>Version</a:t>
+            </a:r>
+            <a:r>
+              <a:rPr lang="en-US" sz="1600" dirty="0">
+                <a:latin typeface="Courier New" panose="02070309020205020404" pitchFamily="49" charset="0"/>
+                <a:cs typeface="Courier New" panose="02070309020205020404" pitchFamily="49" charset="0"/>
+              </a:rPr>
+              <a:t>="</a:t>
+            </a:r>
+            <a:r>
+              <a:rPr lang="en-US" sz="1600" dirty="0">
+                <a:solidFill>
+                  <a:srgbClr val="C00000"/>
+                </a:solidFill>
+                <a:latin typeface="Courier New" panose="02070309020205020404" pitchFamily="49" charset="0"/>
+                <a:cs typeface="Courier New" panose="02070309020205020404" pitchFamily="49" charset="0"/>
+              </a:rPr>
+              <a:t>7.2.2</a:t>
+            </a:r>
+            <a:r>
+              <a:rPr lang="en-US" sz="1600" dirty="0">
+                <a:latin typeface="Courier New" panose="02070309020205020404" pitchFamily="49" charset="0"/>
+                <a:cs typeface="Courier New" panose="02070309020205020404" pitchFamily="49" charset="0"/>
+              </a:rPr>
+              <a:t>" /&gt;</a:t>
+            </a:r>
+          </a:p>
+          <a:p>
+            <a:pPr marL="0" indent="0">
+              <a:buNone/>
+            </a:pPr>
+            <a:endParaRPr lang="en-US" dirty="0"/>
+          </a:p>
+        </p:txBody>
+      </p:sp>
+    </p:spTree>
+    <p:extLst>
+      <p:ext uri="{BB962C8B-B14F-4D97-AF65-F5344CB8AC3E}">
+        <p14:creationId xmlns:p14="http://schemas.microsoft.com/office/powerpoint/2010/main" val="3217918598"/>
+      </p:ext>
+    </p:extLst>
+  </p:cSld>
+  <p:clrMapOvr>
+    <a:masterClrMapping/>
+  </p:clrMapOvr>
+</p:sld>
+</file>
+
+<file path=ppt/slides/slide6.xml><?xml version="1.0" encoding="utf-8"?>
+<p:sld xmlns:a="http://schemas.openxmlformats.org/drawingml/2006/main" xmlns:r="http://schemas.openxmlformats.org/officeDocument/2006/relationships" xmlns:p="http://schemas.openxmlformats.org/presentationml/2006/main">
+  <p:cSld>
+    <p:spTree>
+      <p:nvGrpSpPr>
+        <p:cNvPr id="1" name=""/>
+        <p:cNvGrpSpPr/>
+        <p:nvPr/>
+      </p:nvGrpSpPr>
+      <p:grpSpPr>
+        <a:xfrm>
+          <a:off x="0" y="0"/>
+          <a:ext cx="0" cy="0"/>
+          <a:chOff x="0" y="0"/>
+          <a:chExt cx="0" cy="0"/>
+        </a:xfrm>
+      </p:grpSpPr>
+      <p:sp>
+        <p:nvSpPr>
+          <p:cNvPr id="13" name="Title 12"/>
+          <p:cNvSpPr>
+            <a:spLocks noGrp="1"/>
+          </p:cNvSpPr>
+          <p:nvPr>
+            <p:ph type="title"/>
+          </p:nvPr>
+        </p:nvSpPr>
+        <p:spPr/>
+        <p:txBody>
+          <a:bodyPr/>
+          <a:lstStyle/>
+          <a:p>
+            <a:r>
+              <a:rPr lang="en-US" dirty="0"/>
+              <a:t>Step 2: Add </a:t>
+            </a:r>
+            <a:r>
+              <a:rPr lang="en-US" dirty="0" err="1"/>
+              <a:t>Odata</a:t>
+            </a:r>
+            <a:r>
+              <a:rPr lang="en-US" dirty="0"/>
+              <a:t> to Services Collection</a:t>
+            </a:r>
+            <a:endParaRPr dirty="0"/>
+          </a:p>
+        </p:txBody>
+      </p:sp>
+      <p:sp>
+        <p:nvSpPr>
+          <p:cNvPr id="14" name="Content Placeholder 13"/>
+          <p:cNvSpPr>
+            <a:spLocks noGrp="1"/>
+          </p:cNvSpPr>
+          <p:nvPr>
+            <p:ph idx="1"/>
+          </p:nvPr>
+        </p:nvSpPr>
+        <p:spPr/>
+        <p:txBody>
+          <a:bodyPr>
+            <a:normAutofit/>
+          </a:bodyPr>
+          <a:lstStyle/>
+          <a:p>
+            <a:pPr marL="0" indent="0">
+              <a:buNone/>
+            </a:pPr>
+            <a:r>
+              <a:rPr lang="en-US" dirty="0">
+                <a:solidFill>
+                  <a:srgbClr val="0070C0"/>
+                </a:solidFill>
+                <a:latin typeface="Courier New" panose="02070309020205020404" pitchFamily="49" charset="0"/>
+                <a:cs typeface="Courier New" panose="02070309020205020404" pitchFamily="49" charset="0"/>
+              </a:rPr>
+              <a:t>public</a:t>
+            </a:r>
+            <a:r>
+              <a:rPr lang="en-US" dirty="0">
+                <a:latin typeface="Courier New" panose="02070309020205020404" pitchFamily="49" charset="0"/>
+                <a:cs typeface="Courier New" panose="02070309020205020404" pitchFamily="49" charset="0"/>
+              </a:rPr>
+              <a:t> </a:t>
+            </a:r>
+            <a:r>
+              <a:rPr lang="en-US" dirty="0">
+                <a:solidFill>
+                  <a:srgbClr val="0070C0"/>
+                </a:solidFill>
+                <a:latin typeface="Courier New" panose="02070309020205020404" pitchFamily="49" charset="0"/>
+                <a:cs typeface="Courier New" panose="02070309020205020404" pitchFamily="49" charset="0"/>
+              </a:rPr>
+              <a:t>void</a:t>
+            </a:r>
+            <a:r>
+              <a:rPr lang="en-US" dirty="0">
+                <a:latin typeface="Courier New" panose="02070309020205020404" pitchFamily="49" charset="0"/>
+                <a:cs typeface="Courier New" panose="02070309020205020404" pitchFamily="49" charset="0"/>
+              </a:rPr>
+              <a:t> </a:t>
+            </a:r>
+            <a:r>
+              <a:rPr lang="en-US" dirty="0" err="1">
+                <a:solidFill>
+                  <a:srgbClr val="FFFF00"/>
+                </a:solidFill>
+                <a:latin typeface="Courier New" panose="02070309020205020404" pitchFamily="49" charset="0"/>
+                <a:cs typeface="Courier New" panose="02070309020205020404" pitchFamily="49" charset="0"/>
+              </a:rPr>
+              <a:t>ConfigureServices</a:t>
+            </a:r>
+            <a:r>
+              <a:rPr lang="en-US" dirty="0">
+                <a:latin typeface="Courier New" panose="02070309020205020404" pitchFamily="49" charset="0"/>
+                <a:cs typeface="Courier New" panose="02070309020205020404" pitchFamily="49" charset="0"/>
+              </a:rPr>
+              <a:t>(</a:t>
+            </a:r>
+            <a:r>
+              <a:rPr lang="en-US" dirty="0" err="1">
+                <a:solidFill>
+                  <a:srgbClr val="92D050"/>
+                </a:solidFill>
+                <a:latin typeface="Courier New" panose="02070309020205020404" pitchFamily="49" charset="0"/>
+                <a:cs typeface="Courier New" panose="02070309020205020404" pitchFamily="49" charset="0"/>
+              </a:rPr>
+              <a:t>IServiceCollection</a:t>
+            </a:r>
+            <a:r>
+              <a:rPr lang="en-US" dirty="0">
+                <a:latin typeface="Courier New" panose="02070309020205020404" pitchFamily="49" charset="0"/>
+                <a:cs typeface="Courier New" panose="02070309020205020404" pitchFamily="49" charset="0"/>
+              </a:rPr>
+              <a:t> </a:t>
+            </a:r>
+            <a:r>
+              <a:rPr lang="en-US" dirty="0">
+                <a:solidFill>
+                  <a:srgbClr val="00B0F0"/>
+                </a:solidFill>
+                <a:latin typeface="Courier New" panose="02070309020205020404" pitchFamily="49" charset="0"/>
+                <a:cs typeface="Courier New" panose="02070309020205020404" pitchFamily="49" charset="0"/>
+              </a:rPr>
+              <a:t>services</a:t>
+            </a:r>
+            <a:r>
+              <a:rPr lang="en-US" dirty="0">
+                <a:latin typeface="Courier New" panose="02070309020205020404" pitchFamily="49" charset="0"/>
+                <a:cs typeface="Courier New" panose="02070309020205020404" pitchFamily="49" charset="0"/>
+              </a:rPr>
+              <a:t>)</a:t>
+            </a:r>
+            <a:br>
+              <a:rPr lang="en-US" dirty="0">
+                <a:latin typeface="Courier New" panose="02070309020205020404" pitchFamily="49" charset="0"/>
+                <a:cs typeface="Courier New" panose="02070309020205020404" pitchFamily="49" charset="0"/>
+              </a:rPr>
+            </a:br>
+            <a:r>
+              <a:rPr lang="en-US" dirty="0">
+                <a:latin typeface="Courier New" panose="02070309020205020404" pitchFamily="49" charset="0"/>
+                <a:cs typeface="Courier New" panose="02070309020205020404" pitchFamily="49" charset="0"/>
+              </a:rPr>
+              <a:t>{</a:t>
+            </a:r>
+            <a:br>
+              <a:rPr lang="en-US" dirty="0">
+                <a:latin typeface="Courier New" panose="02070309020205020404" pitchFamily="49" charset="0"/>
+                <a:cs typeface="Courier New" panose="02070309020205020404" pitchFamily="49" charset="0"/>
+              </a:rPr>
+            </a:br>
+            <a:r>
+              <a:rPr lang="en-US" dirty="0">
+                <a:latin typeface="Courier New" panose="02070309020205020404" pitchFamily="49" charset="0"/>
+                <a:cs typeface="Courier New" panose="02070309020205020404" pitchFamily="49" charset="0"/>
+              </a:rPr>
+              <a:t>	...</a:t>
+            </a:r>
+            <a:br>
+              <a:rPr lang="en-US" dirty="0">
+                <a:latin typeface="Courier New" panose="02070309020205020404" pitchFamily="49" charset="0"/>
+                <a:cs typeface="Courier New" panose="02070309020205020404" pitchFamily="49" charset="0"/>
+              </a:rPr>
+            </a:br>
+            <a:r>
+              <a:rPr lang="en-US" dirty="0">
+                <a:latin typeface="Courier New" panose="02070309020205020404" pitchFamily="49" charset="0"/>
+                <a:cs typeface="Courier New" panose="02070309020205020404" pitchFamily="49" charset="0"/>
+              </a:rPr>
+              <a:t>	</a:t>
+            </a:r>
+            <a:r>
+              <a:rPr lang="en-US" dirty="0">
+                <a:solidFill>
+                  <a:srgbClr val="00B050"/>
+                </a:solidFill>
+                <a:latin typeface="Courier New" panose="02070309020205020404" pitchFamily="49" charset="0"/>
+                <a:cs typeface="Courier New" panose="02070309020205020404" pitchFamily="49" charset="0"/>
+              </a:rPr>
+              <a:t>// Add the OData Service</a:t>
+            </a:r>
+            <a:br>
+              <a:rPr lang="en-US" dirty="0">
+                <a:solidFill>
+                  <a:srgbClr val="00B050"/>
+                </a:solidFill>
+                <a:latin typeface="Courier New" panose="02070309020205020404" pitchFamily="49" charset="0"/>
+                <a:cs typeface="Courier New" panose="02070309020205020404" pitchFamily="49" charset="0"/>
+              </a:rPr>
+            </a:br>
+            <a:r>
+              <a:rPr lang="en-US" dirty="0">
+                <a:latin typeface="Courier New" panose="02070309020205020404" pitchFamily="49" charset="0"/>
+                <a:cs typeface="Courier New" panose="02070309020205020404" pitchFamily="49" charset="0"/>
+              </a:rPr>
+              <a:t>	</a:t>
+            </a:r>
+            <a:r>
+              <a:rPr lang="en-US" dirty="0" err="1">
+                <a:solidFill>
+                  <a:srgbClr val="00B0F0"/>
+                </a:solidFill>
+                <a:latin typeface="Courier New" panose="02070309020205020404" pitchFamily="49" charset="0"/>
+                <a:cs typeface="Courier New" panose="02070309020205020404" pitchFamily="49" charset="0"/>
+              </a:rPr>
+              <a:t>services</a:t>
+            </a:r>
+            <a:r>
+              <a:rPr lang="en-US" dirty="0" err="1">
+                <a:latin typeface="Courier New" panose="02070309020205020404" pitchFamily="49" charset="0"/>
+                <a:cs typeface="Courier New" panose="02070309020205020404" pitchFamily="49" charset="0"/>
+              </a:rPr>
+              <a:t>.</a:t>
+            </a:r>
+            <a:r>
+              <a:rPr lang="en-US" dirty="0" err="1">
+                <a:solidFill>
+                  <a:srgbClr val="FFFF00"/>
+                </a:solidFill>
+                <a:latin typeface="Courier New" panose="02070309020205020404" pitchFamily="49" charset="0"/>
+                <a:cs typeface="Courier New" panose="02070309020205020404" pitchFamily="49" charset="0"/>
+              </a:rPr>
+              <a:t>AddOData</a:t>
+            </a:r>
+            <a:r>
+              <a:rPr lang="en-US" dirty="0">
+                <a:latin typeface="Courier New" panose="02070309020205020404" pitchFamily="49" charset="0"/>
+                <a:cs typeface="Courier New" panose="02070309020205020404" pitchFamily="49" charset="0"/>
+              </a:rPr>
+              <a:t>();</a:t>
+            </a:r>
+            <a:br>
+              <a:rPr lang="en-US" dirty="0">
+                <a:latin typeface="Courier New" panose="02070309020205020404" pitchFamily="49" charset="0"/>
+                <a:cs typeface="Courier New" panose="02070309020205020404" pitchFamily="49" charset="0"/>
+              </a:rPr>
+            </a:br>
+            <a:r>
+              <a:rPr lang="en-US" dirty="0">
+                <a:latin typeface="Courier New" panose="02070309020205020404" pitchFamily="49" charset="0"/>
+                <a:cs typeface="Courier New" panose="02070309020205020404" pitchFamily="49" charset="0"/>
+              </a:rPr>
+              <a:t>}</a:t>
+            </a:r>
+          </a:p>
+          <a:p>
+            <a:pPr marL="0" indent="0">
+              <a:buNone/>
+            </a:pPr>
+            <a:endParaRPr lang="en-US" dirty="0"/>
+          </a:p>
+        </p:txBody>
+      </p:sp>
+    </p:spTree>
+    <p:extLst>
+      <p:ext uri="{BB962C8B-B14F-4D97-AF65-F5344CB8AC3E}">
+        <p14:creationId xmlns:p14="http://schemas.microsoft.com/office/powerpoint/2010/main" val="2945049552"/>
+      </p:ext>
+    </p:extLst>
+  </p:cSld>
+  <p:clrMapOvr>
+    <a:masterClrMapping/>
+  </p:clrMapOvr>
+</p:sld>
+</file>
+
+<file path=ppt/slides/slide7.xml><?xml version="1.0" encoding="utf-8"?>
+<p:sld xmlns:a="http://schemas.openxmlformats.org/drawingml/2006/main" xmlns:r="http://schemas.openxmlformats.org/officeDocument/2006/relationships" xmlns:p="http://schemas.openxmlformats.org/presentationml/2006/main">
+  <p:cSld>
+    <p:spTree>
+      <p:nvGrpSpPr>
+        <p:cNvPr id="1" name=""/>
+        <p:cNvGrpSpPr/>
+        <p:nvPr/>
+      </p:nvGrpSpPr>
+      <p:grpSpPr>
+        <a:xfrm>
+          <a:off x="0" y="0"/>
+          <a:ext cx="0" cy="0"/>
+          <a:chOff x="0" y="0"/>
+          <a:chExt cx="0" cy="0"/>
+        </a:xfrm>
+      </p:grpSpPr>
+      <p:sp>
+        <p:nvSpPr>
+          <p:cNvPr id="13" name="Title 12"/>
+          <p:cNvSpPr>
+            <a:spLocks noGrp="1"/>
+          </p:cNvSpPr>
+          <p:nvPr>
+            <p:ph type="title"/>
+          </p:nvPr>
+        </p:nvSpPr>
+        <p:spPr/>
+        <p:txBody>
+          <a:bodyPr/>
+          <a:lstStyle/>
+          <a:p>
+            <a:r>
+              <a:rPr lang="en-US" dirty="0"/>
+              <a:t>Step 3: Change the MVC Route</a:t>
+            </a:r>
+            <a:endParaRPr dirty="0"/>
+          </a:p>
+        </p:txBody>
+      </p:sp>
+      <p:sp>
+        <p:nvSpPr>
+          <p:cNvPr id="14" name="Content Placeholder 13"/>
+          <p:cNvSpPr>
+            <a:spLocks noGrp="1"/>
+          </p:cNvSpPr>
+          <p:nvPr>
+            <p:ph idx="1"/>
+          </p:nvPr>
+        </p:nvSpPr>
+        <p:spPr/>
+        <p:txBody>
+          <a:bodyPr>
+            <a:normAutofit lnSpcReduction="10000"/>
+          </a:bodyPr>
+          <a:lstStyle/>
+          <a:p>
+            <a:pPr marL="0" indent="0">
+              <a:buNone/>
+            </a:pPr>
+            <a:r>
+              <a:rPr lang="en-US" dirty="0">
+                <a:solidFill>
+                  <a:srgbClr val="0070C0"/>
+                </a:solidFill>
+                <a:latin typeface="Courier New" panose="02070309020205020404" pitchFamily="49" charset="0"/>
+                <a:cs typeface="Courier New" panose="02070309020205020404" pitchFamily="49" charset="0"/>
+              </a:rPr>
+              <a:t>public</a:t>
+            </a:r>
+            <a:r>
+              <a:rPr lang="en-US" dirty="0">
+                <a:latin typeface="Courier New" panose="02070309020205020404" pitchFamily="49" charset="0"/>
+                <a:cs typeface="Courier New" panose="02070309020205020404" pitchFamily="49" charset="0"/>
+              </a:rPr>
+              <a:t> </a:t>
+            </a:r>
+            <a:r>
+              <a:rPr lang="en-US" dirty="0">
+                <a:solidFill>
+                  <a:srgbClr val="0070C0"/>
+                </a:solidFill>
+                <a:latin typeface="Courier New" panose="02070309020205020404" pitchFamily="49" charset="0"/>
+                <a:cs typeface="Courier New" panose="02070309020205020404" pitchFamily="49" charset="0"/>
+              </a:rPr>
+              <a:t>void</a:t>
+            </a:r>
+            <a:r>
+              <a:rPr lang="en-US" dirty="0">
+                <a:latin typeface="Courier New" panose="02070309020205020404" pitchFamily="49" charset="0"/>
+                <a:cs typeface="Courier New" panose="02070309020205020404" pitchFamily="49" charset="0"/>
+              </a:rPr>
+              <a:t> </a:t>
+            </a:r>
+            <a:r>
+              <a:rPr lang="en-US" dirty="0">
+                <a:solidFill>
+                  <a:srgbClr val="FFFF00"/>
+                </a:solidFill>
+                <a:latin typeface="Courier New" panose="02070309020205020404" pitchFamily="49" charset="0"/>
+                <a:cs typeface="Courier New" panose="02070309020205020404" pitchFamily="49" charset="0"/>
+              </a:rPr>
+              <a:t>Configure</a:t>
+            </a:r>
+            <a:r>
+              <a:rPr lang="en-US" dirty="0">
+                <a:latin typeface="Courier New" panose="02070309020205020404" pitchFamily="49" charset="0"/>
+                <a:cs typeface="Courier New" panose="02070309020205020404" pitchFamily="49" charset="0"/>
+              </a:rPr>
+              <a:t>(</a:t>
+            </a:r>
+            <a:r>
+              <a:rPr lang="en-US" dirty="0" err="1">
+                <a:solidFill>
+                  <a:srgbClr val="92D050"/>
+                </a:solidFill>
+                <a:latin typeface="Courier New" panose="02070309020205020404" pitchFamily="49" charset="0"/>
+                <a:cs typeface="Courier New" panose="02070309020205020404" pitchFamily="49" charset="0"/>
+              </a:rPr>
+              <a:t>IApplicationBuilder</a:t>
+            </a:r>
+            <a:r>
+              <a:rPr lang="en-US" dirty="0">
+                <a:latin typeface="Courier New" panose="02070309020205020404" pitchFamily="49" charset="0"/>
+                <a:cs typeface="Courier New" panose="02070309020205020404" pitchFamily="49" charset="0"/>
+              </a:rPr>
+              <a:t> </a:t>
+            </a:r>
+            <a:r>
+              <a:rPr lang="en-US" dirty="0">
+                <a:solidFill>
+                  <a:srgbClr val="00B0F0"/>
+                </a:solidFill>
+                <a:latin typeface="Courier New" panose="02070309020205020404" pitchFamily="49" charset="0"/>
+                <a:cs typeface="Courier New" panose="02070309020205020404" pitchFamily="49" charset="0"/>
+              </a:rPr>
+              <a:t>app</a:t>
+            </a:r>
+            <a:r>
+              <a:rPr lang="en-US" dirty="0">
+                <a:latin typeface="Courier New" panose="02070309020205020404" pitchFamily="49" charset="0"/>
+                <a:cs typeface="Courier New" panose="02070309020205020404" pitchFamily="49" charset="0"/>
+              </a:rPr>
+              <a:t>, </a:t>
+            </a:r>
+            <a:br>
+              <a:rPr lang="en-US" dirty="0">
+                <a:latin typeface="Courier New" panose="02070309020205020404" pitchFamily="49" charset="0"/>
+                <a:cs typeface="Courier New" panose="02070309020205020404" pitchFamily="49" charset="0"/>
+              </a:rPr>
+            </a:br>
+            <a:r>
+              <a:rPr lang="en-US" dirty="0">
+                <a:latin typeface="Courier New" panose="02070309020205020404" pitchFamily="49" charset="0"/>
+                <a:cs typeface="Courier New" panose="02070309020205020404" pitchFamily="49" charset="0"/>
+              </a:rPr>
+              <a:t>			    </a:t>
+            </a:r>
+            <a:r>
+              <a:rPr lang="en-US" dirty="0" err="1">
+                <a:solidFill>
+                  <a:srgbClr val="92D050"/>
+                </a:solidFill>
+                <a:latin typeface="Courier New" panose="02070309020205020404" pitchFamily="49" charset="0"/>
+                <a:cs typeface="Courier New" panose="02070309020205020404" pitchFamily="49" charset="0"/>
+              </a:rPr>
+              <a:t>IHostingEnvironment</a:t>
+            </a:r>
+            <a:r>
+              <a:rPr lang="en-US" dirty="0">
+                <a:latin typeface="Courier New" panose="02070309020205020404" pitchFamily="49" charset="0"/>
+                <a:cs typeface="Courier New" panose="02070309020205020404" pitchFamily="49" charset="0"/>
+              </a:rPr>
+              <a:t> </a:t>
+            </a:r>
+            <a:r>
+              <a:rPr lang="en-US" dirty="0">
+                <a:solidFill>
+                  <a:srgbClr val="00B0F0"/>
+                </a:solidFill>
+                <a:latin typeface="Courier New" panose="02070309020205020404" pitchFamily="49" charset="0"/>
+                <a:cs typeface="Courier New" panose="02070309020205020404" pitchFamily="49" charset="0"/>
+              </a:rPr>
+              <a:t>env</a:t>
+            </a:r>
+            <a:r>
+              <a:rPr lang="en-US" dirty="0">
+                <a:latin typeface="Courier New" panose="02070309020205020404" pitchFamily="49" charset="0"/>
+                <a:cs typeface="Courier New" panose="02070309020205020404" pitchFamily="49" charset="0"/>
+              </a:rPr>
+              <a:t>)</a:t>
+            </a:r>
+            <a:br>
+              <a:rPr lang="en-US" dirty="0">
+                <a:latin typeface="Courier New" panose="02070309020205020404" pitchFamily="49" charset="0"/>
+                <a:cs typeface="Courier New" panose="02070309020205020404" pitchFamily="49" charset="0"/>
+              </a:rPr>
+            </a:br>
+            <a:r>
+              <a:rPr lang="en-US" dirty="0">
+                <a:latin typeface="Courier New" panose="02070309020205020404" pitchFamily="49" charset="0"/>
+                <a:cs typeface="Courier New" panose="02070309020205020404" pitchFamily="49" charset="0"/>
+              </a:rPr>
+              <a:t>{</a:t>
+            </a:r>
+          </a:p>
+          <a:p>
+            <a:pPr marL="0" indent="0">
+              <a:buNone/>
+            </a:pPr>
+            <a:r>
+              <a:rPr lang="en-US" dirty="0">
+                <a:latin typeface="Courier New" panose="02070309020205020404" pitchFamily="49" charset="0"/>
+                <a:cs typeface="Courier New" panose="02070309020205020404" pitchFamily="49" charset="0"/>
+              </a:rPr>
+              <a:t>	…</a:t>
+            </a:r>
+            <a:br>
+              <a:rPr lang="en-US" dirty="0">
+                <a:latin typeface="Courier New" panose="02070309020205020404" pitchFamily="49" charset="0"/>
+                <a:cs typeface="Courier New" panose="02070309020205020404" pitchFamily="49" charset="0"/>
+              </a:rPr>
+            </a:br>
+            <a:r>
+              <a:rPr lang="en-US" dirty="0">
+                <a:latin typeface="Courier New" panose="02070309020205020404" pitchFamily="49" charset="0"/>
+                <a:cs typeface="Courier New" panose="02070309020205020404" pitchFamily="49" charset="0"/>
+              </a:rPr>
+              <a:t>	</a:t>
+            </a:r>
+            <a:r>
+              <a:rPr lang="en-US" dirty="0">
+                <a:solidFill>
+                  <a:srgbClr val="00B050"/>
+                </a:solidFill>
+                <a:latin typeface="Courier New" panose="02070309020205020404" pitchFamily="49" charset="0"/>
+                <a:cs typeface="Courier New" panose="02070309020205020404" pitchFamily="49" charset="0"/>
+              </a:rPr>
+              <a:t>// </a:t>
+            </a:r>
+            <a:r>
+              <a:rPr lang="en-US" dirty="0" err="1">
+                <a:solidFill>
+                  <a:srgbClr val="00B050"/>
+                </a:solidFill>
+                <a:latin typeface="Courier New" panose="02070309020205020404" pitchFamily="49" charset="0"/>
+                <a:cs typeface="Courier New" panose="02070309020205020404" pitchFamily="49" charset="0"/>
+              </a:rPr>
+              <a:t>app.UseMvc</a:t>
+            </a:r>
+            <a:r>
+              <a:rPr lang="en-US" dirty="0">
+                <a:solidFill>
+                  <a:srgbClr val="00B050"/>
+                </a:solidFill>
+                <a:latin typeface="Courier New" panose="02070309020205020404" pitchFamily="49" charset="0"/>
+                <a:cs typeface="Courier New" panose="02070309020205020404" pitchFamily="49" charset="0"/>
+              </a:rPr>
+              <a:t>();</a:t>
+            </a:r>
+            <a:br>
+              <a:rPr lang="en-US" dirty="0">
+                <a:latin typeface="Courier New" panose="02070309020205020404" pitchFamily="49" charset="0"/>
+                <a:cs typeface="Courier New" panose="02070309020205020404" pitchFamily="49" charset="0"/>
+              </a:rPr>
+            </a:br>
+            <a:r>
+              <a:rPr lang="en-US" dirty="0">
+                <a:latin typeface="Courier New" panose="02070309020205020404" pitchFamily="49" charset="0"/>
+                <a:cs typeface="Courier New" panose="02070309020205020404" pitchFamily="49" charset="0"/>
+              </a:rPr>
+              <a:t>	</a:t>
+            </a:r>
+            <a:r>
+              <a:rPr lang="en-US" dirty="0" err="1">
+                <a:solidFill>
+                  <a:srgbClr val="00B0F0"/>
+                </a:solidFill>
+                <a:latin typeface="Courier New" panose="02070309020205020404" pitchFamily="49" charset="0"/>
+                <a:cs typeface="Courier New" panose="02070309020205020404" pitchFamily="49" charset="0"/>
+              </a:rPr>
+              <a:t>app</a:t>
+            </a:r>
+            <a:r>
+              <a:rPr lang="en-US" dirty="0" err="1">
+                <a:latin typeface="Courier New" panose="02070309020205020404" pitchFamily="49" charset="0"/>
+                <a:cs typeface="Courier New" panose="02070309020205020404" pitchFamily="49" charset="0"/>
+              </a:rPr>
+              <a:t>.</a:t>
+            </a:r>
+            <a:r>
+              <a:rPr lang="en-US" dirty="0" err="1">
+                <a:solidFill>
+                  <a:srgbClr val="FFFF00"/>
+                </a:solidFill>
+                <a:latin typeface="Courier New" panose="02070309020205020404" pitchFamily="49" charset="0"/>
+                <a:cs typeface="Courier New" panose="02070309020205020404" pitchFamily="49" charset="0"/>
+              </a:rPr>
+              <a:t>UseMvc</a:t>
+            </a:r>
+            <a:r>
+              <a:rPr lang="en-US" dirty="0">
+                <a:latin typeface="Courier New" panose="02070309020205020404" pitchFamily="49" charset="0"/>
+                <a:cs typeface="Courier New" panose="02070309020205020404" pitchFamily="49" charset="0"/>
+              </a:rPr>
+              <a:t>(</a:t>
+            </a:r>
+            <a:r>
+              <a:rPr lang="en-US" dirty="0" err="1">
+                <a:solidFill>
+                  <a:srgbClr val="00B0F0"/>
+                </a:solidFill>
+                <a:latin typeface="Courier New" panose="02070309020205020404" pitchFamily="49" charset="0"/>
+                <a:cs typeface="Courier New" panose="02070309020205020404" pitchFamily="49" charset="0"/>
+              </a:rPr>
+              <a:t>routeBuilder</a:t>
+            </a:r>
+            <a:r>
+              <a:rPr lang="en-US" dirty="0">
+                <a:latin typeface="Courier New" panose="02070309020205020404" pitchFamily="49" charset="0"/>
+                <a:cs typeface="Courier New" panose="02070309020205020404" pitchFamily="49" charset="0"/>
+              </a:rPr>
+              <a:t> =&gt;</a:t>
+            </a:r>
+            <a:br>
+              <a:rPr lang="en-US" dirty="0">
+                <a:latin typeface="Courier New" panose="02070309020205020404" pitchFamily="49" charset="0"/>
+                <a:cs typeface="Courier New" panose="02070309020205020404" pitchFamily="49" charset="0"/>
+              </a:rPr>
+            </a:br>
+            <a:r>
+              <a:rPr lang="en-US" dirty="0">
+                <a:latin typeface="Courier New" panose="02070309020205020404" pitchFamily="49" charset="0"/>
+                <a:cs typeface="Courier New" panose="02070309020205020404" pitchFamily="49" charset="0"/>
+              </a:rPr>
+              <a:t>	{</a:t>
+            </a:r>
+            <a:br>
+              <a:rPr lang="en-US" dirty="0">
+                <a:latin typeface="Courier New" panose="02070309020205020404" pitchFamily="49" charset="0"/>
+                <a:cs typeface="Courier New" panose="02070309020205020404" pitchFamily="49" charset="0"/>
+              </a:rPr>
+            </a:br>
+            <a:r>
+              <a:rPr lang="en-US" dirty="0">
+                <a:latin typeface="Courier New" panose="02070309020205020404" pitchFamily="49" charset="0"/>
+                <a:cs typeface="Courier New" panose="02070309020205020404" pitchFamily="49" charset="0"/>
+              </a:rPr>
+              <a:t>		</a:t>
+            </a:r>
+            <a:r>
+              <a:rPr lang="en-US" dirty="0" err="1">
+                <a:solidFill>
+                  <a:srgbClr val="00B0F0"/>
+                </a:solidFill>
+                <a:latin typeface="Courier New" panose="02070309020205020404" pitchFamily="49" charset="0"/>
+                <a:cs typeface="Courier New" panose="02070309020205020404" pitchFamily="49" charset="0"/>
+              </a:rPr>
+              <a:t>routeBuilder</a:t>
+            </a:r>
+            <a:r>
+              <a:rPr lang="en-US" dirty="0" err="1">
+                <a:latin typeface="Courier New" panose="02070309020205020404" pitchFamily="49" charset="0"/>
+                <a:cs typeface="Courier New" panose="02070309020205020404" pitchFamily="49" charset="0"/>
+              </a:rPr>
+              <a:t>.</a:t>
+            </a:r>
+            <a:r>
+              <a:rPr lang="en-US" dirty="0" err="1">
+                <a:solidFill>
+                  <a:srgbClr val="FFFF00"/>
+                </a:solidFill>
+                <a:latin typeface="Courier New" panose="02070309020205020404" pitchFamily="49" charset="0"/>
+                <a:cs typeface="Courier New" panose="02070309020205020404" pitchFamily="49" charset="0"/>
+              </a:rPr>
+              <a:t>EnableDependencyInjection</a:t>
+            </a:r>
+            <a:r>
+              <a:rPr lang="en-US" dirty="0">
+                <a:latin typeface="Courier New" panose="02070309020205020404" pitchFamily="49" charset="0"/>
+                <a:cs typeface="Courier New" panose="02070309020205020404" pitchFamily="49" charset="0"/>
+              </a:rPr>
+              <a:t>();</a:t>
+            </a:r>
+            <a:br>
+              <a:rPr lang="en-US" dirty="0">
+                <a:latin typeface="Courier New" panose="02070309020205020404" pitchFamily="49" charset="0"/>
+                <a:cs typeface="Courier New" panose="02070309020205020404" pitchFamily="49" charset="0"/>
+              </a:rPr>
+            </a:br>
+            <a:r>
+              <a:rPr lang="en-US" dirty="0">
+                <a:latin typeface="Courier New" panose="02070309020205020404" pitchFamily="49" charset="0"/>
+                <a:cs typeface="Courier New" panose="02070309020205020404" pitchFamily="49" charset="0"/>
+              </a:rPr>
+              <a:t>		</a:t>
+            </a:r>
+            <a:r>
+              <a:rPr lang="en-US" dirty="0" err="1">
+                <a:solidFill>
+                  <a:srgbClr val="00B0F0"/>
+                </a:solidFill>
+                <a:latin typeface="Courier New" panose="02070309020205020404" pitchFamily="49" charset="0"/>
+                <a:cs typeface="Courier New" panose="02070309020205020404" pitchFamily="49" charset="0"/>
+              </a:rPr>
+              <a:t>routeBuilder</a:t>
+            </a:r>
+            <a:r>
+              <a:rPr lang="en-US" dirty="0" err="1">
+                <a:latin typeface="Courier New" panose="02070309020205020404" pitchFamily="49" charset="0"/>
+                <a:cs typeface="Courier New" panose="02070309020205020404" pitchFamily="49" charset="0"/>
+              </a:rPr>
+              <a:t>.</a:t>
+            </a:r>
+            <a:r>
+              <a:rPr lang="en-US" dirty="0" err="1">
+                <a:solidFill>
+                  <a:srgbClr val="FFFF00"/>
+                </a:solidFill>
+                <a:latin typeface="Courier New" panose="02070309020205020404" pitchFamily="49" charset="0"/>
+                <a:cs typeface="Courier New" panose="02070309020205020404" pitchFamily="49" charset="0"/>
+              </a:rPr>
+              <a:t>Select</a:t>
+            </a:r>
+            <a:r>
+              <a:rPr lang="en-US" dirty="0">
+                <a:latin typeface="Courier New" panose="02070309020205020404" pitchFamily="49" charset="0"/>
+                <a:cs typeface="Courier New" panose="02070309020205020404" pitchFamily="49" charset="0"/>
+              </a:rPr>
+              <a:t>()</a:t>
+            </a:r>
+            <a:br>
+              <a:rPr lang="en-US" dirty="0">
+                <a:latin typeface="Courier New" panose="02070309020205020404" pitchFamily="49" charset="0"/>
+                <a:cs typeface="Courier New" panose="02070309020205020404" pitchFamily="49" charset="0"/>
+              </a:rPr>
+            </a:br>
+            <a:r>
+              <a:rPr lang="en-US" dirty="0">
+                <a:latin typeface="Courier New" panose="02070309020205020404" pitchFamily="49" charset="0"/>
+                <a:cs typeface="Courier New" panose="02070309020205020404" pitchFamily="49" charset="0"/>
+              </a:rPr>
+              <a:t>				.</a:t>
+            </a:r>
+            <a:r>
+              <a:rPr lang="en-US" dirty="0" err="1">
+                <a:solidFill>
+                  <a:srgbClr val="FFFF00"/>
+                </a:solidFill>
+                <a:latin typeface="Courier New" panose="02070309020205020404" pitchFamily="49" charset="0"/>
+                <a:cs typeface="Courier New" panose="02070309020205020404" pitchFamily="49" charset="0"/>
+              </a:rPr>
+              <a:t>OrderBy</a:t>
+            </a:r>
+            <a:r>
+              <a:rPr lang="en-US" dirty="0">
+                <a:latin typeface="Courier New" panose="02070309020205020404" pitchFamily="49" charset="0"/>
+                <a:cs typeface="Courier New" panose="02070309020205020404" pitchFamily="49" charset="0"/>
+              </a:rPr>
+              <a:t>()</a:t>
+            </a:r>
+            <a:br>
+              <a:rPr lang="en-US" dirty="0">
+                <a:latin typeface="Courier New" panose="02070309020205020404" pitchFamily="49" charset="0"/>
+                <a:cs typeface="Courier New" panose="02070309020205020404" pitchFamily="49" charset="0"/>
+              </a:rPr>
+            </a:br>
+            <a:r>
+              <a:rPr lang="en-US" dirty="0">
+                <a:latin typeface="Courier New" panose="02070309020205020404" pitchFamily="49" charset="0"/>
+                <a:cs typeface="Courier New" panose="02070309020205020404" pitchFamily="49" charset="0"/>
+              </a:rPr>
+              <a:t>				.</a:t>
+            </a:r>
+            <a:r>
+              <a:rPr lang="en-US" dirty="0">
+                <a:solidFill>
+                  <a:srgbClr val="FFFF00"/>
+                </a:solidFill>
+                <a:latin typeface="Courier New" panose="02070309020205020404" pitchFamily="49" charset="0"/>
+                <a:cs typeface="Courier New" panose="02070309020205020404" pitchFamily="49" charset="0"/>
+              </a:rPr>
+              <a:t>Filter</a:t>
+            </a:r>
+            <a:r>
+              <a:rPr lang="en-US" dirty="0">
+                <a:latin typeface="Courier New" panose="02070309020205020404" pitchFamily="49" charset="0"/>
+                <a:cs typeface="Courier New" panose="02070309020205020404" pitchFamily="49" charset="0"/>
+              </a:rPr>
+              <a:t>()</a:t>
+            </a:r>
+            <a:br>
+              <a:rPr lang="en-US" dirty="0">
+                <a:latin typeface="Courier New" panose="02070309020205020404" pitchFamily="49" charset="0"/>
+                <a:cs typeface="Courier New" panose="02070309020205020404" pitchFamily="49" charset="0"/>
+              </a:rPr>
+            </a:br>
+            <a:r>
+              <a:rPr lang="en-US" dirty="0">
+                <a:latin typeface="Courier New" panose="02070309020205020404" pitchFamily="49" charset="0"/>
+                <a:cs typeface="Courier New" panose="02070309020205020404" pitchFamily="49" charset="0"/>
+              </a:rPr>
+              <a:t>				.</a:t>
+            </a:r>
+            <a:r>
+              <a:rPr lang="en-US" dirty="0" err="1">
+                <a:solidFill>
+                  <a:srgbClr val="FFFF00"/>
+                </a:solidFill>
+                <a:latin typeface="Courier New" panose="02070309020205020404" pitchFamily="49" charset="0"/>
+                <a:cs typeface="Courier New" panose="02070309020205020404" pitchFamily="49" charset="0"/>
+              </a:rPr>
+              <a:t>SkipToken</a:t>
+            </a:r>
+            <a:r>
+              <a:rPr lang="en-US" dirty="0">
+                <a:latin typeface="Courier New" panose="02070309020205020404" pitchFamily="49" charset="0"/>
+                <a:cs typeface="Courier New" panose="02070309020205020404" pitchFamily="49" charset="0"/>
+              </a:rPr>
+              <a:t>()</a:t>
+            </a:r>
+            <a:br>
+              <a:rPr lang="en-US" dirty="0">
+                <a:latin typeface="Courier New" panose="02070309020205020404" pitchFamily="49" charset="0"/>
+                <a:cs typeface="Courier New" panose="02070309020205020404" pitchFamily="49" charset="0"/>
+              </a:rPr>
+            </a:br>
+            <a:r>
+              <a:rPr lang="en-US" dirty="0">
+                <a:latin typeface="Courier New" panose="02070309020205020404" pitchFamily="49" charset="0"/>
+                <a:cs typeface="Courier New" panose="02070309020205020404" pitchFamily="49" charset="0"/>
+              </a:rPr>
+              <a:t>				.</a:t>
+            </a:r>
+            <a:r>
+              <a:rPr lang="en-US" dirty="0" err="1">
+                <a:solidFill>
+                  <a:srgbClr val="FFFF00"/>
+                </a:solidFill>
+                <a:latin typeface="Courier New" panose="02070309020205020404" pitchFamily="49" charset="0"/>
+                <a:cs typeface="Courier New" panose="02070309020205020404" pitchFamily="49" charset="0"/>
+              </a:rPr>
+              <a:t>MaxTop</a:t>
+            </a:r>
+            <a:r>
+              <a:rPr lang="en-US" dirty="0">
+                <a:latin typeface="Courier New" panose="02070309020205020404" pitchFamily="49" charset="0"/>
+                <a:cs typeface="Courier New" panose="02070309020205020404" pitchFamily="49" charset="0"/>
+              </a:rPr>
+              <a:t>(4)</a:t>
+            </a:r>
+            <a:br>
+              <a:rPr lang="en-US" dirty="0">
+                <a:latin typeface="Courier New" panose="02070309020205020404" pitchFamily="49" charset="0"/>
+                <a:cs typeface="Courier New" panose="02070309020205020404" pitchFamily="49" charset="0"/>
+              </a:rPr>
+            </a:br>
+            <a:r>
+              <a:rPr lang="en-US" dirty="0">
+                <a:latin typeface="Courier New" panose="02070309020205020404" pitchFamily="49" charset="0"/>
+                <a:cs typeface="Courier New" panose="02070309020205020404" pitchFamily="49" charset="0"/>
+              </a:rPr>
+              <a:t>				.</a:t>
+            </a:r>
+            <a:r>
+              <a:rPr lang="en-US" dirty="0">
+                <a:solidFill>
+                  <a:srgbClr val="FFFF00"/>
+                </a:solidFill>
+                <a:latin typeface="Courier New" panose="02070309020205020404" pitchFamily="49" charset="0"/>
+                <a:cs typeface="Courier New" panose="02070309020205020404" pitchFamily="49" charset="0"/>
+              </a:rPr>
+              <a:t>Expand</a:t>
+            </a:r>
+            <a:r>
+              <a:rPr lang="en-US" dirty="0">
+                <a:latin typeface="Courier New" panose="02070309020205020404" pitchFamily="49" charset="0"/>
+                <a:cs typeface="Courier New" panose="02070309020205020404" pitchFamily="49" charset="0"/>
+              </a:rPr>
+              <a:t>();</a:t>
+            </a:r>
+            <a:br>
+              <a:rPr lang="en-US" dirty="0">
+                <a:latin typeface="Courier New" panose="02070309020205020404" pitchFamily="49" charset="0"/>
+                <a:cs typeface="Courier New" panose="02070309020205020404" pitchFamily="49" charset="0"/>
+              </a:rPr>
+            </a:br>
+            <a:r>
+              <a:rPr lang="en-US" dirty="0">
+                <a:latin typeface="Courier New" panose="02070309020205020404" pitchFamily="49" charset="0"/>
+                <a:cs typeface="Courier New" panose="02070309020205020404" pitchFamily="49" charset="0"/>
+              </a:rPr>
+              <a:t>	});</a:t>
+            </a:r>
+            <a:br>
+              <a:rPr lang="en-US" dirty="0">
+                <a:latin typeface="Courier New" panose="02070309020205020404" pitchFamily="49" charset="0"/>
+                <a:cs typeface="Courier New" panose="02070309020205020404" pitchFamily="49" charset="0"/>
+              </a:rPr>
+            </a:br>
+            <a:r>
+              <a:rPr lang="en-US" dirty="0">
+                <a:latin typeface="Courier New" panose="02070309020205020404" pitchFamily="49" charset="0"/>
+                <a:cs typeface="Courier New" panose="02070309020205020404" pitchFamily="49" charset="0"/>
+              </a:rPr>
+              <a:t>}</a:t>
+            </a:r>
+          </a:p>
+        </p:txBody>
+      </p:sp>
+    </p:spTree>
+    <p:extLst>
+      <p:ext uri="{BB962C8B-B14F-4D97-AF65-F5344CB8AC3E}">
+        <p14:creationId xmlns:p14="http://schemas.microsoft.com/office/powerpoint/2010/main" val="729552480"/>
+      </p:ext>
+    </p:extLst>
+  </p:cSld>
+  <p:clrMapOvr>
+    <a:masterClrMapping/>
+  </p:clrMapOvr>
+</p:sld>
+</file>
+
+<file path=ppt/slides/slide8.xml><?xml version="1.0" encoding="utf-8"?>
+<p:sld xmlns:a="http://schemas.openxmlformats.org/drawingml/2006/main" xmlns:r="http://schemas.openxmlformats.org/officeDocument/2006/relationships" xmlns:p="http://schemas.openxmlformats.org/presentationml/2006/main">
+  <p:cSld>
+    <p:spTree>
+      <p:nvGrpSpPr>
+        <p:cNvPr id="1" name=""/>
+        <p:cNvGrpSpPr/>
+        <p:nvPr/>
+      </p:nvGrpSpPr>
+      <p:grpSpPr>
+        <a:xfrm>
+          <a:off x="0" y="0"/>
+          <a:ext cx="0" cy="0"/>
+          <a:chOff x="0" y="0"/>
+          <a:chExt cx="0" cy="0"/>
+        </a:xfrm>
+      </p:grpSpPr>
+      <p:sp>
+        <p:nvSpPr>
+          <p:cNvPr id="13" name="Title 12"/>
+          <p:cNvSpPr>
+            <a:spLocks noGrp="1"/>
+          </p:cNvSpPr>
+          <p:nvPr>
+            <p:ph type="title"/>
+          </p:nvPr>
+        </p:nvSpPr>
+        <p:spPr/>
+        <p:txBody>
+          <a:bodyPr/>
+          <a:lstStyle/>
+          <a:p>
+            <a:r>
+              <a:rPr lang="en-US" dirty="0"/>
+              <a:t>Step 4: Enable Query on the API</a:t>
+            </a:r>
+            <a:endParaRPr dirty="0"/>
+          </a:p>
+        </p:txBody>
+      </p:sp>
+      <p:sp>
+        <p:nvSpPr>
+          <p:cNvPr id="14" name="Content Placeholder 13"/>
+          <p:cNvSpPr>
+            <a:spLocks noGrp="1"/>
+          </p:cNvSpPr>
+          <p:nvPr>
+            <p:ph idx="1"/>
+          </p:nvPr>
+        </p:nvSpPr>
+        <p:spPr/>
+        <p:txBody>
+          <a:bodyPr>
+            <a:normAutofit/>
+          </a:bodyPr>
+          <a:lstStyle/>
+          <a:p>
+            <a:pPr marL="0" indent="0">
+              <a:buNone/>
+            </a:pPr>
+            <a:r>
+              <a:rPr lang="en-US" dirty="0">
+                <a:latin typeface="Courier New" panose="02070309020205020404" pitchFamily="49" charset="0"/>
+                <a:cs typeface="Courier New" panose="02070309020205020404" pitchFamily="49" charset="0"/>
+              </a:rPr>
+              <a:t>[</a:t>
+            </a:r>
+            <a:r>
+              <a:rPr lang="en-US" dirty="0" err="1">
+                <a:solidFill>
+                  <a:srgbClr val="92D050"/>
+                </a:solidFill>
+                <a:latin typeface="Courier New" panose="02070309020205020404" pitchFamily="49" charset="0"/>
+                <a:cs typeface="Courier New" panose="02070309020205020404" pitchFamily="49" charset="0"/>
+              </a:rPr>
+              <a:t>HttpGet</a:t>
+            </a:r>
+            <a:r>
+              <a:rPr lang="en-US" dirty="0">
+                <a:latin typeface="Courier New" panose="02070309020205020404" pitchFamily="49" charset="0"/>
+                <a:cs typeface="Courier New" panose="02070309020205020404" pitchFamily="49" charset="0"/>
+              </a:rPr>
+              <a:t>]</a:t>
+            </a:r>
+            <a:br>
+              <a:rPr lang="en-US" dirty="0">
+                <a:latin typeface="Courier New" panose="02070309020205020404" pitchFamily="49" charset="0"/>
+                <a:cs typeface="Courier New" panose="02070309020205020404" pitchFamily="49" charset="0"/>
+              </a:rPr>
+            </a:br>
+            <a:r>
+              <a:rPr lang="en-US" dirty="0">
+                <a:latin typeface="Courier New" panose="02070309020205020404" pitchFamily="49" charset="0"/>
+                <a:cs typeface="Courier New" panose="02070309020205020404" pitchFamily="49" charset="0"/>
+              </a:rPr>
+              <a:t>[</a:t>
+            </a:r>
+            <a:r>
+              <a:rPr lang="en-US" dirty="0" err="1">
+                <a:solidFill>
+                  <a:srgbClr val="92D050"/>
+                </a:solidFill>
+                <a:latin typeface="Courier New" panose="02070309020205020404" pitchFamily="49" charset="0"/>
+                <a:cs typeface="Courier New" panose="02070309020205020404" pitchFamily="49" charset="0"/>
+              </a:rPr>
+              <a:t>EnableQuery</a:t>
+            </a:r>
+            <a:r>
+              <a:rPr lang="en-US" dirty="0">
+                <a:latin typeface="Courier New" panose="02070309020205020404" pitchFamily="49" charset="0"/>
+                <a:cs typeface="Courier New" panose="02070309020205020404" pitchFamily="49" charset="0"/>
+              </a:rPr>
+              <a:t>()] </a:t>
+            </a:r>
+            <a:r>
+              <a:rPr lang="en-US" dirty="0">
+                <a:solidFill>
+                  <a:srgbClr val="00B050"/>
+                </a:solidFill>
+                <a:latin typeface="Courier New" panose="02070309020205020404" pitchFamily="49" charset="0"/>
+                <a:cs typeface="Courier New" panose="02070309020205020404" pitchFamily="49" charset="0"/>
+              </a:rPr>
+              <a:t>// </a:t>
+            </a:r>
+            <a:r>
+              <a:rPr lang="en-US" dirty="0">
+                <a:solidFill>
+                  <a:srgbClr val="00B050"/>
+                </a:solidFill>
+                <a:latin typeface="Courier New" panose="02070309020205020404" pitchFamily="49" charset="0"/>
+                <a:cs typeface="Courier New" panose="02070309020205020404" pitchFamily="49" charset="0"/>
+                <a:sym typeface="Wingdings" panose="05000000000000000000" pitchFamily="2" charset="2"/>
+              </a:rPr>
+              <a:t> Add this line</a:t>
+            </a:r>
+            <a:br>
+              <a:rPr lang="en-US" dirty="0">
+                <a:latin typeface="Courier New" panose="02070309020205020404" pitchFamily="49" charset="0"/>
+                <a:cs typeface="Courier New" panose="02070309020205020404" pitchFamily="49" charset="0"/>
+              </a:rPr>
+            </a:br>
+            <a:r>
+              <a:rPr lang="en-US" dirty="0">
+                <a:solidFill>
+                  <a:srgbClr val="0070C0"/>
+                </a:solidFill>
+                <a:latin typeface="Courier New" panose="02070309020205020404" pitchFamily="49" charset="0"/>
+                <a:cs typeface="Courier New" panose="02070309020205020404" pitchFamily="49" charset="0"/>
+              </a:rPr>
+              <a:t>public</a:t>
+            </a:r>
+            <a:r>
+              <a:rPr lang="en-US" dirty="0">
+                <a:latin typeface="Courier New" panose="02070309020205020404" pitchFamily="49" charset="0"/>
+                <a:cs typeface="Courier New" panose="02070309020205020404" pitchFamily="49" charset="0"/>
+              </a:rPr>
+              <a:t> </a:t>
+            </a:r>
+            <a:r>
+              <a:rPr lang="en-US" dirty="0" err="1">
+                <a:solidFill>
+                  <a:srgbClr val="92D050"/>
+                </a:solidFill>
+                <a:latin typeface="Courier New" panose="02070309020205020404" pitchFamily="49" charset="0"/>
+                <a:cs typeface="Courier New" panose="02070309020205020404" pitchFamily="49" charset="0"/>
+              </a:rPr>
+              <a:t>ActionResult</a:t>
+            </a:r>
+            <a:r>
+              <a:rPr lang="en-US" dirty="0">
+                <a:latin typeface="Courier New" panose="02070309020205020404" pitchFamily="49" charset="0"/>
+                <a:cs typeface="Courier New" panose="02070309020205020404" pitchFamily="49" charset="0"/>
+              </a:rPr>
+              <a:t>&lt;</a:t>
+            </a:r>
+            <a:r>
+              <a:rPr lang="en-US" dirty="0" err="1">
+                <a:solidFill>
+                  <a:srgbClr val="92D050"/>
+                </a:solidFill>
+                <a:latin typeface="Courier New" panose="02070309020205020404" pitchFamily="49" charset="0"/>
+                <a:cs typeface="Courier New" panose="02070309020205020404" pitchFamily="49" charset="0"/>
+              </a:rPr>
+              <a:t>IEnumerable</a:t>
+            </a:r>
+            <a:r>
+              <a:rPr lang="en-US" dirty="0">
+                <a:latin typeface="Courier New" panose="02070309020205020404" pitchFamily="49" charset="0"/>
+                <a:cs typeface="Courier New" panose="02070309020205020404" pitchFamily="49" charset="0"/>
+              </a:rPr>
+              <a:t>&lt;</a:t>
+            </a:r>
+            <a:r>
+              <a:rPr lang="en-US" dirty="0">
+                <a:solidFill>
+                  <a:srgbClr val="92D050"/>
+                </a:solidFill>
+                <a:latin typeface="Courier New" panose="02070309020205020404" pitchFamily="49" charset="0"/>
+                <a:cs typeface="Courier New" panose="02070309020205020404" pitchFamily="49" charset="0"/>
+              </a:rPr>
+              <a:t>Card</a:t>
+            </a:r>
+            <a:r>
+              <a:rPr lang="en-US" dirty="0">
+                <a:latin typeface="Courier New" panose="02070309020205020404" pitchFamily="49" charset="0"/>
+                <a:cs typeface="Courier New" panose="02070309020205020404" pitchFamily="49" charset="0"/>
+              </a:rPr>
+              <a:t>&gt;&gt; </a:t>
+            </a:r>
+            <a:r>
+              <a:rPr lang="en-US" dirty="0">
+                <a:solidFill>
+                  <a:srgbClr val="FFFF00"/>
+                </a:solidFill>
+                <a:latin typeface="Courier New" panose="02070309020205020404" pitchFamily="49" charset="0"/>
+                <a:cs typeface="Courier New" panose="02070309020205020404" pitchFamily="49" charset="0"/>
+              </a:rPr>
+              <a:t>Get</a:t>
+            </a:r>
+            <a:r>
+              <a:rPr lang="en-US" dirty="0">
+                <a:latin typeface="Courier New" panose="02070309020205020404" pitchFamily="49" charset="0"/>
+                <a:cs typeface="Courier New" panose="02070309020205020404" pitchFamily="49" charset="0"/>
+              </a:rPr>
+              <a:t>()</a:t>
+            </a:r>
+            <a:br>
+              <a:rPr lang="en-US" dirty="0">
+                <a:latin typeface="Courier New" panose="02070309020205020404" pitchFamily="49" charset="0"/>
+                <a:cs typeface="Courier New" panose="02070309020205020404" pitchFamily="49" charset="0"/>
+              </a:rPr>
+            </a:br>
+            <a:r>
+              <a:rPr lang="en-US" dirty="0">
+                <a:latin typeface="Courier New" panose="02070309020205020404" pitchFamily="49" charset="0"/>
+                <a:cs typeface="Courier New" panose="02070309020205020404" pitchFamily="49" charset="0"/>
+              </a:rPr>
+              <a:t>{</a:t>
+            </a:r>
+            <a:br>
+              <a:rPr lang="en-US" dirty="0">
+                <a:latin typeface="Courier New" panose="02070309020205020404" pitchFamily="49" charset="0"/>
+                <a:cs typeface="Courier New" panose="02070309020205020404" pitchFamily="49" charset="0"/>
+              </a:rPr>
+            </a:br>
+            <a:r>
+              <a:rPr lang="en-US" dirty="0">
+                <a:latin typeface="Courier New" panose="02070309020205020404" pitchFamily="49" charset="0"/>
+                <a:cs typeface="Courier New" panose="02070309020205020404" pitchFamily="49" charset="0"/>
+              </a:rPr>
+              <a:t>	</a:t>
+            </a:r>
+            <a:r>
+              <a:rPr lang="en-US" dirty="0">
+                <a:solidFill>
+                  <a:srgbClr val="7030A0"/>
+                </a:solidFill>
+                <a:latin typeface="Courier New" panose="02070309020205020404" pitchFamily="49" charset="0"/>
+                <a:cs typeface="Courier New" panose="02070309020205020404" pitchFamily="49" charset="0"/>
+              </a:rPr>
+              <a:t>return</a:t>
+            </a:r>
+            <a:r>
+              <a:rPr lang="en-US" dirty="0">
+                <a:latin typeface="Courier New" panose="02070309020205020404" pitchFamily="49" charset="0"/>
+                <a:cs typeface="Courier New" panose="02070309020205020404" pitchFamily="49" charset="0"/>
+              </a:rPr>
+              <a:t> </a:t>
+            </a:r>
+            <a:r>
+              <a:rPr lang="en-US" dirty="0">
+                <a:solidFill>
+                  <a:srgbClr val="FFFF00"/>
+                </a:solidFill>
+                <a:latin typeface="Courier New" panose="02070309020205020404" pitchFamily="49" charset="0"/>
+                <a:cs typeface="Courier New" panose="02070309020205020404" pitchFamily="49" charset="0"/>
+              </a:rPr>
+              <a:t>Ok</a:t>
+            </a:r>
+            <a:r>
+              <a:rPr lang="en-US" dirty="0">
+                <a:latin typeface="Courier New" panose="02070309020205020404" pitchFamily="49" charset="0"/>
+                <a:cs typeface="Courier New" panose="02070309020205020404" pitchFamily="49" charset="0"/>
+              </a:rPr>
+              <a:t>(_</a:t>
+            </a:r>
+            <a:r>
+              <a:rPr lang="en-US" dirty="0" err="1">
+                <a:solidFill>
+                  <a:srgbClr val="00B0F0"/>
+                </a:solidFill>
+                <a:latin typeface="Courier New" panose="02070309020205020404" pitchFamily="49" charset="0"/>
+                <a:cs typeface="Courier New" panose="02070309020205020404" pitchFamily="49" charset="0"/>
+              </a:rPr>
+              <a:t>context</a:t>
+            </a:r>
+            <a:r>
+              <a:rPr lang="en-US" dirty="0" err="1">
+                <a:latin typeface="Courier New" panose="02070309020205020404" pitchFamily="49" charset="0"/>
+                <a:cs typeface="Courier New" panose="02070309020205020404" pitchFamily="49" charset="0"/>
+              </a:rPr>
+              <a:t>.</a:t>
+            </a:r>
+            <a:r>
+              <a:rPr lang="en-US" dirty="0" err="1">
+                <a:solidFill>
+                  <a:srgbClr val="00B0F0"/>
+                </a:solidFill>
+                <a:latin typeface="Courier New" panose="02070309020205020404" pitchFamily="49" charset="0"/>
+                <a:cs typeface="Courier New" panose="02070309020205020404" pitchFamily="49" charset="0"/>
+              </a:rPr>
+              <a:t>Cards</a:t>
+            </a:r>
+            <a:r>
+              <a:rPr lang="en-US" dirty="0">
+                <a:latin typeface="Courier New" panose="02070309020205020404" pitchFamily="49" charset="0"/>
+                <a:cs typeface="Courier New" panose="02070309020205020404" pitchFamily="49" charset="0"/>
+              </a:rPr>
+              <a:t>);</a:t>
+            </a:r>
+            <a:br>
+              <a:rPr lang="en-US" dirty="0">
+                <a:latin typeface="Courier New" panose="02070309020205020404" pitchFamily="49" charset="0"/>
+                <a:cs typeface="Courier New" panose="02070309020205020404" pitchFamily="49" charset="0"/>
+              </a:rPr>
+            </a:br>
+            <a:r>
+              <a:rPr lang="en-US" dirty="0">
+                <a:latin typeface="Courier New" panose="02070309020205020404" pitchFamily="49" charset="0"/>
+                <a:cs typeface="Courier New" panose="02070309020205020404" pitchFamily="49" charset="0"/>
+              </a:rPr>
+              <a:t>}</a:t>
+            </a:r>
+            <a:br>
+              <a:rPr lang="en-US" dirty="0"/>
+            </a:br>
+            <a:endParaRPr lang="en-US" dirty="0"/>
+          </a:p>
+        </p:txBody>
+      </p:sp>
+    </p:spTree>
+    <p:extLst>
+      <p:ext uri="{BB962C8B-B14F-4D97-AF65-F5344CB8AC3E}">
+        <p14:creationId xmlns:p14="http://schemas.microsoft.com/office/powerpoint/2010/main" val="2418507439"/>
+      </p:ext>
+    </p:extLst>
+  </p:cSld>
+  <p:clrMapOvr>
+    <a:masterClrMapping/>
+  </p:clrMapOvr>
+</p:sld>
+</file>
+
+<file path=ppt/slides/slide9.xml><?xml version="1.0" encoding="utf-8"?>
+<p:sld xmlns:a="http://schemas.openxmlformats.org/drawingml/2006/main" xmlns:r="http://schemas.openxmlformats.org/officeDocument/2006/relationships" xmlns:p="http://schemas.openxmlformats.org/presentationml/2006/main">
+  <p:cSld>
+    <p:spTree>
+      <p:nvGrpSpPr>
+        <p:cNvPr id="1" name=""/>
+        <p:cNvGrpSpPr/>
+        <p:nvPr/>
+      </p:nvGrpSpPr>
+      <p:grpSpPr>
+        <a:xfrm>
+          <a:off x="0" y="0"/>
+          <a:ext cx="0" cy="0"/>
+          <a:chOff x="0" y="0"/>
+          <a:chExt cx="0" cy="0"/>
+        </a:xfrm>
+      </p:grpSpPr>
+      <p:sp>
+        <p:nvSpPr>
+          <p:cNvPr id="13" name="Title 12"/>
+          <p:cNvSpPr>
+            <a:spLocks noGrp="1"/>
+          </p:cNvSpPr>
+          <p:nvPr>
+            <p:ph type="title"/>
+          </p:nvPr>
+        </p:nvSpPr>
+        <p:spPr/>
+        <p:txBody>
+          <a:bodyPr/>
+          <a:lstStyle/>
+          <a:p>
+            <a:r>
+              <a:rPr lang="en-US" dirty="0"/>
+              <a:t>Resources</a:t>
+            </a:r>
+            <a:endParaRPr dirty="0"/>
+          </a:p>
+        </p:txBody>
+      </p:sp>
+      <p:sp>
+        <p:nvSpPr>
+          <p:cNvPr id="14" name="Content Placeholder 13"/>
+          <p:cNvSpPr>
+            <a:spLocks noGrp="1"/>
+          </p:cNvSpPr>
+          <p:nvPr>
+            <p:ph idx="1"/>
+          </p:nvPr>
+        </p:nvSpPr>
+        <p:spPr/>
+        <p:txBody>
+          <a:bodyPr>
+            <a:normAutofit/>
+          </a:bodyPr>
+          <a:lstStyle/>
+          <a:p>
+            <a:pPr marL="0" indent="0">
+              <a:buNone/>
+            </a:pPr>
+            <a:br>
+              <a:rPr lang="en-US" dirty="0"/>
+            </a:br>
+            <a:r>
+              <a:rPr lang="en-US" dirty="0"/>
+              <a:t>Original Project by  Jack Kinsey</a:t>
+            </a:r>
+          </a:p>
+          <a:p>
+            <a:pPr marL="0" indent="0">
+              <a:buNone/>
+            </a:pPr>
+            <a:r>
+              <a:rPr lang="en-US" dirty="0">
+                <a:hlinkClick r:id="rId2"/>
+              </a:rPr>
+              <a:t>https://github.com/jackwkinsey/mtg-api</a:t>
+            </a:r>
+            <a:r>
+              <a:rPr lang="en-US" dirty="0"/>
+              <a:t> </a:t>
+            </a:r>
+          </a:p>
+          <a:p>
+            <a:pPr marL="0" indent="0">
+              <a:buNone/>
+            </a:pPr>
+            <a:endParaRPr lang="en-US" dirty="0"/>
+          </a:p>
+          <a:p>
+            <a:pPr marL="0" indent="0">
+              <a:buNone/>
+            </a:pPr>
+            <a:r>
+              <a:rPr lang="en-US" dirty="0" err="1"/>
+              <a:t>Odata</a:t>
+            </a:r>
+            <a:r>
+              <a:rPr lang="en-US" dirty="0"/>
+              <a:t> Version</a:t>
+            </a:r>
+          </a:p>
+          <a:p>
+            <a:pPr marL="0" indent="0">
+              <a:buNone/>
+            </a:pPr>
+            <a:r>
+              <a:rPr lang="en-US" dirty="0">
+                <a:hlinkClick r:id="rId3"/>
+              </a:rPr>
+              <a:t>https://github.com/jeff-maxwell/mtg-api</a:t>
+            </a:r>
+            <a:r>
+              <a:rPr lang="en-US" dirty="0"/>
+              <a:t> </a:t>
+            </a:r>
+          </a:p>
+        </p:txBody>
+      </p:sp>
+    </p:spTree>
+    <p:extLst>
+      <p:ext uri="{BB962C8B-B14F-4D97-AF65-F5344CB8AC3E}">
+        <p14:creationId xmlns:p14="http://schemas.microsoft.com/office/powerpoint/2010/main" val="1576235933"/>
       </p:ext>
     </p:extLst>
   </p:cSld>

</xml_diff>